<commit_message>
added class notes and labs
</commit_message>
<xml_diff>
--- a/Slides/Azure_Data_Lake_Storage/Azure Data Lake Gen2.pptx
+++ b/Slides/Azure_Data_Lake_Storage/Azure Data Lake Gen2.pptx
@@ -285,7 +285,7 @@
           <a:p>
             <a:fld id="{C4D45232-753D-4BF0-8A89-12EA0B172E71}" type="datetimeFigureOut">
               <a:rPr lang="en-IN" smtClean="0"/>
-              <a:t>10-01-2023</a:t>
+              <a:t>22-02-2023</a:t>
             </a:fld>
             <a:endParaRPr lang="en-IN"/>
           </a:p>
@@ -485,7 +485,7 @@
           <a:p>
             <a:fld id="{C4D45232-753D-4BF0-8A89-12EA0B172E71}" type="datetimeFigureOut">
               <a:rPr lang="en-IN" smtClean="0"/>
-              <a:t>10-01-2023</a:t>
+              <a:t>22-02-2023</a:t>
             </a:fld>
             <a:endParaRPr lang="en-IN"/>
           </a:p>
@@ -695,7 +695,7 @@
           <a:p>
             <a:fld id="{C4D45232-753D-4BF0-8A89-12EA0B172E71}" type="datetimeFigureOut">
               <a:rPr lang="en-IN" smtClean="0"/>
-              <a:t>10-01-2023</a:t>
+              <a:t>22-02-2023</a:t>
             </a:fld>
             <a:endParaRPr lang="en-IN"/>
           </a:p>
@@ -895,7 +895,7 @@
           <a:p>
             <a:fld id="{C4D45232-753D-4BF0-8A89-12EA0B172E71}" type="datetimeFigureOut">
               <a:rPr lang="en-IN" smtClean="0"/>
-              <a:t>10-01-2023</a:t>
+              <a:t>22-02-2023</a:t>
             </a:fld>
             <a:endParaRPr lang="en-IN"/>
           </a:p>
@@ -1171,7 +1171,7 @@
           <a:p>
             <a:fld id="{C4D45232-753D-4BF0-8A89-12EA0B172E71}" type="datetimeFigureOut">
               <a:rPr lang="en-IN" smtClean="0"/>
-              <a:t>10-01-2023</a:t>
+              <a:t>22-02-2023</a:t>
             </a:fld>
             <a:endParaRPr lang="en-IN"/>
           </a:p>
@@ -1439,7 +1439,7 @@
           <a:p>
             <a:fld id="{C4D45232-753D-4BF0-8A89-12EA0B172E71}" type="datetimeFigureOut">
               <a:rPr lang="en-IN" smtClean="0"/>
-              <a:t>10-01-2023</a:t>
+              <a:t>22-02-2023</a:t>
             </a:fld>
             <a:endParaRPr lang="en-IN"/>
           </a:p>
@@ -1854,7 +1854,7 @@
           <a:p>
             <a:fld id="{C4D45232-753D-4BF0-8A89-12EA0B172E71}" type="datetimeFigureOut">
               <a:rPr lang="en-IN" smtClean="0"/>
-              <a:t>10-01-2023</a:t>
+              <a:t>22-02-2023</a:t>
             </a:fld>
             <a:endParaRPr lang="en-IN"/>
           </a:p>
@@ -1996,7 +1996,7 @@
           <a:p>
             <a:fld id="{C4D45232-753D-4BF0-8A89-12EA0B172E71}" type="datetimeFigureOut">
               <a:rPr lang="en-IN" smtClean="0"/>
-              <a:t>10-01-2023</a:t>
+              <a:t>22-02-2023</a:t>
             </a:fld>
             <a:endParaRPr lang="en-IN"/>
           </a:p>
@@ -2109,7 +2109,7 @@
           <a:p>
             <a:fld id="{C4D45232-753D-4BF0-8A89-12EA0B172E71}" type="datetimeFigureOut">
               <a:rPr lang="en-IN" smtClean="0"/>
-              <a:t>10-01-2023</a:t>
+              <a:t>22-02-2023</a:t>
             </a:fld>
             <a:endParaRPr lang="en-IN"/>
           </a:p>
@@ -2422,7 +2422,7 @@
           <a:p>
             <a:fld id="{C4D45232-753D-4BF0-8A89-12EA0B172E71}" type="datetimeFigureOut">
               <a:rPr lang="en-IN" smtClean="0"/>
-              <a:t>10-01-2023</a:t>
+              <a:t>22-02-2023</a:t>
             </a:fld>
             <a:endParaRPr lang="en-IN"/>
           </a:p>
@@ -2711,7 +2711,7 @@
           <a:p>
             <a:fld id="{C4D45232-753D-4BF0-8A89-12EA0B172E71}" type="datetimeFigureOut">
               <a:rPr lang="en-IN" smtClean="0"/>
-              <a:t>10-01-2023</a:t>
+              <a:t>22-02-2023</a:t>
             </a:fld>
             <a:endParaRPr lang="en-IN"/>
           </a:p>
@@ -2954,7 +2954,7 @@
           <a:p>
             <a:fld id="{C4D45232-753D-4BF0-8A89-12EA0B172E71}" type="datetimeFigureOut">
               <a:rPr lang="en-IN" smtClean="0"/>
-              <a:t>10-01-2023</a:t>
+              <a:t>22-02-2023</a:t>
             </a:fld>
             <a:endParaRPr lang="en-IN"/>
           </a:p>

</xml_diff>